<commit_message>
Add animation, first commit of PDF version
</commit_message>
<xml_diff>
--- a/presentations/WorkingCollaborativelyIntro.pptx
+++ b/presentations/WorkingCollaborativelyIntro.pptx
@@ -202,7 +202,7 @@
           <a:p>
             <a:fld id="{BF9E9971-F775-4B4F-9523-C252FD816536}" type="datetimeFigureOut">
               <a:rPr lang="en-US" smtClean="0"/>
-              <a:t>7/7/23</a:t>
+              <a:t>7/9/23</a:t>
             </a:fld>
             <a:endParaRPr lang="en-US"/>
           </a:p>
@@ -1120,7 +1120,7 @@
           <a:p>
             <a:fld id="{86253E89-F168-3842-8374-F70D79A089A6}" type="datetimeFigureOut">
               <a:rPr lang="en-US" smtClean="0"/>
-              <a:t>7/7/23</a:t>
+              <a:t>7/9/23</a:t>
             </a:fld>
             <a:endParaRPr lang="en-US"/>
           </a:p>
@@ -1318,7 +1318,7 @@
           <a:p>
             <a:fld id="{86253E89-F168-3842-8374-F70D79A089A6}" type="datetimeFigureOut">
               <a:rPr lang="en-US" smtClean="0"/>
-              <a:t>7/7/23</a:t>
+              <a:t>7/9/23</a:t>
             </a:fld>
             <a:endParaRPr lang="en-US"/>
           </a:p>
@@ -1526,7 +1526,7 @@
           <a:p>
             <a:fld id="{86253E89-F168-3842-8374-F70D79A089A6}" type="datetimeFigureOut">
               <a:rPr lang="en-US" smtClean="0"/>
-              <a:t>7/7/23</a:t>
+              <a:t>7/9/23</a:t>
             </a:fld>
             <a:endParaRPr lang="en-US"/>
           </a:p>
@@ -1724,7 +1724,7 @@
           <a:p>
             <a:fld id="{86253E89-F168-3842-8374-F70D79A089A6}" type="datetimeFigureOut">
               <a:rPr lang="en-US" smtClean="0"/>
-              <a:t>7/7/23</a:t>
+              <a:t>7/9/23</a:t>
             </a:fld>
             <a:endParaRPr lang="en-US"/>
           </a:p>
@@ -1999,7 +1999,7 @@
           <a:p>
             <a:fld id="{86253E89-F168-3842-8374-F70D79A089A6}" type="datetimeFigureOut">
               <a:rPr lang="en-US" smtClean="0"/>
-              <a:t>7/7/23</a:t>
+              <a:t>7/9/23</a:t>
             </a:fld>
             <a:endParaRPr lang="en-US"/>
           </a:p>
@@ -2264,7 +2264,7 @@
           <a:p>
             <a:fld id="{86253E89-F168-3842-8374-F70D79A089A6}" type="datetimeFigureOut">
               <a:rPr lang="en-US" smtClean="0"/>
-              <a:t>7/7/23</a:t>
+              <a:t>7/9/23</a:t>
             </a:fld>
             <a:endParaRPr lang="en-US"/>
           </a:p>
@@ -2676,7 +2676,7 @@
           <a:p>
             <a:fld id="{86253E89-F168-3842-8374-F70D79A089A6}" type="datetimeFigureOut">
               <a:rPr lang="en-US" smtClean="0"/>
-              <a:t>7/7/23</a:t>
+              <a:t>7/9/23</a:t>
             </a:fld>
             <a:endParaRPr lang="en-US"/>
           </a:p>
@@ -2817,7 +2817,7 @@
           <a:p>
             <a:fld id="{86253E89-F168-3842-8374-F70D79A089A6}" type="datetimeFigureOut">
               <a:rPr lang="en-US" smtClean="0"/>
-              <a:t>7/7/23</a:t>
+              <a:t>7/9/23</a:t>
             </a:fld>
             <a:endParaRPr lang="en-US"/>
           </a:p>
@@ -2930,7 +2930,7 @@
           <a:p>
             <a:fld id="{86253E89-F168-3842-8374-F70D79A089A6}" type="datetimeFigureOut">
               <a:rPr lang="en-US" smtClean="0"/>
-              <a:t>7/7/23</a:t>
+              <a:t>7/9/23</a:t>
             </a:fld>
             <a:endParaRPr lang="en-US"/>
           </a:p>
@@ -3241,7 +3241,7 @@
           <a:p>
             <a:fld id="{86253E89-F168-3842-8374-F70D79A089A6}" type="datetimeFigureOut">
               <a:rPr lang="en-US" smtClean="0"/>
-              <a:t>7/7/23</a:t>
+              <a:t>7/9/23</a:t>
             </a:fld>
             <a:endParaRPr lang="en-US"/>
           </a:p>
@@ -3529,7 +3529,7 @@
           <a:p>
             <a:fld id="{86253E89-F168-3842-8374-F70D79A089A6}" type="datetimeFigureOut">
               <a:rPr lang="en-US" smtClean="0"/>
-              <a:t>7/7/23</a:t>
+              <a:t>7/9/23</a:t>
             </a:fld>
             <a:endParaRPr lang="en-US"/>
           </a:p>
@@ -3770,7 +3770,7 @@
           <a:p>
             <a:fld id="{86253E89-F168-3842-8374-F70D79A089A6}" type="datetimeFigureOut">
               <a:rPr lang="en-US" smtClean="0"/>
-              <a:t>7/7/23</a:t>
+              <a:t>7/9/23</a:t>
             </a:fld>
             <a:endParaRPr lang="en-US"/>
           </a:p>
@@ -4470,6 +4470,426 @@
   <p:clrMapOvr>
     <a:masterClrMapping/>
   </p:clrMapOvr>
+  <p:timing>
+    <p:tnLst>
+      <p:par>
+        <p:cTn id="1" dur="indefinite" restart="never" nodeType="tmRoot">
+          <p:childTnLst>
+            <p:seq concurrent="1" nextAc="seek">
+              <p:cTn id="2" dur="indefinite" nodeType="mainSeq">
+                <p:childTnLst>
+                  <p:par>
+                    <p:cTn id="3" fill="hold">
+                      <p:stCondLst>
+                        <p:cond delay="indefinite"/>
+                      </p:stCondLst>
+                      <p:childTnLst>
+                        <p:par>
+                          <p:cTn id="4" fill="hold">
+                            <p:stCondLst>
+                              <p:cond delay="0"/>
+                            </p:stCondLst>
+                            <p:childTnLst>
+                              <p:par>
+                                <p:cTn id="5" presetID="1" presetClass="entr" presetSubtype="0" fill="hold" grpId="0" nodeType="clickEffect">
+                                  <p:stCondLst>
+                                    <p:cond delay="0"/>
+                                  </p:stCondLst>
+                                  <p:childTnLst>
+                                    <p:set>
+                                      <p:cBhvr>
+                                        <p:cTn id="6" dur="1" fill="hold">
+                                          <p:stCondLst>
+                                            <p:cond delay="0"/>
+                                          </p:stCondLst>
+                                        </p:cTn>
+                                        <p:tgtEl>
+                                          <p:spTgt spid="3">
+                                            <p:txEl>
+                                              <p:pRg st="0" end="0"/>
+                                            </p:txEl>
+                                          </p:spTgt>
+                                        </p:tgtEl>
+                                        <p:attrNameLst>
+                                          <p:attrName>style.visibility</p:attrName>
+                                        </p:attrNameLst>
+                                      </p:cBhvr>
+                                      <p:to>
+                                        <p:strVal val="visible"/>
+                                      </p:to>
+                                    </p:set>
+                                  </p:childTnLst>
+                                </p:cTn>
+                              </p:par>
+                            </p:childTnLst>
+                          </p:cTn>
+                        </p:par>
+                      </p:childTnLst>
+                    </p:cTn>
+                  </p:par>
+                  <p:par>
+                    <p:cTn id="7" fill="hold">
+                      <p:stCondLst>
+                        <p:cond delay="indefinite"/>
+                      </p:stCondLst>
+                      <p:childTnLst>
+                        <p:par>
+                          <p:cTn id="8" fill="hold">
+                            <p:stCondLst>
+                              <p:cond delay="0"/>
+                            </p:stCondLst>
+                            <p:childTnLst>
+                              <p:par>
+                                <p:cTn id="9" presetID="1" presetClass="entr" presetSubtype="0" fill="hold" grpId="0" nodeType="clickEffect">
+                                  <p:stCondLst>
+                                    <p:cond delay="0"/>
+                                  </p:stCondLst>
+                                  <p:childTnLst>
+                                    <p:set>
+                                      <p:cBhvr>
+                                        <p:cTn id="10" dur="1" fill="hold">
+                                          <p:stCondLst>
+                                            <p:cond delay="0"/>
+                                          </p:stCondLst>
+                                        </p:cTn>
+                                        <p:tgtEl>
+                                          <p:spTgt spid="3">
+                                            <p:txEl>
+                                              <p:pRg st="1" end="1"/>
+                                            </p:txEl>
+                                          </p:spTgt>
+                                        </p:tgtEl>
+                                        <p:attrNameLst>
+                                          <p:attrName>style.visibility</p:attrName>
+                                        </p:attrNameLst>
+                                      </p:cBhvr>
+                                      <p:to>
+                                        <p:strVal val="visible"/>
+                                      </p:to>
+                                    </p:set>
+                                  </p:childTnLst>
+                                </p:cTn>
+                              </p:par>
+                              <p:par>
+                                <p:cTn id="11" presetID="1" presetClass="entr" presetSubtype="0" fill="hold" grpId="0" nodeType="withEffect">
+                                  <p:stCondLst>
+                                    <p:cond delay="0"/>
+                                  </p:stCondLst>
+                                  <p:childTnLst>
+                                    <p:set>
+                                      <p:cBhvr>
+                                        <p:cTn id="12" dur="1" fill="hold">
+                                          <p:stCondLst>
+                                            <p:cond delay="0"/>
+                                          </p:stCondLst>
+                                        </p:cTn>
+                                        <p:tgtEl>
+                                          <p:spTgt spid="3">
+                                            <p:txEl>
+                                              <p:pRg st="2" end="2"/>
+                                            </p:txEl>
+                                          </p:spTgt>
+                                        </p:tgtEl>
+                                        <p:attrNameLst>
+                                          <p:attrName>style.visibility</p:attrName>
+                                        </p:attrNameLst>
+                                      </p:cBhvr>
+                                      <p:to>
+                                        <p:strVal val="visible"/>
+                                      </p:to>
+                                    </p:set>
+                                  </p:childTnLst>
+                                </p:cTn>
+                              </p:par>
+                              <p:par>
+                                <p:cTn id="13" presetID="1" presetClass="entr" presetSubtype="0" fill="hold" grpId="0" nodeType="withEffect">
+                                  <p:stCondLst>
+                                    <p:cond delay="0"/>
+                                  </p:stCondLst>
+                                  <p:childTnLst>
+                                    <p:set>
+                                      <p:cBhvr>
+                                        <p:cTn id="14" dur="1" fill="hold">
+                                          <p:stCondLst>
+                                            <p:cond delay="0"/>
+                                          </p:stCondLst>
+                                        </p:cTn>
+                                        <p:tgtEl>
+                                          <p:spTgt spid="3">
+                                            <p:txEl>
+                                              <p:pRg st="3" end="3"/>
+                                            </p:txEl>
+                                          </p:spTgt>
+                                        </p:tgtEl>
+                                        <p:attrNameLst>
+                                          <p:attrName>style.visibility</p:attrName>
+                                        </p:attrNameLst>
+                                      </p:cBhvr>
+                                      <p:to>
+                                        <p:strVal val="visible"/>
+                                      </p:to>
+                                    </p:set>
+                                  </p:childTnLst>
+                                </p:cTn>
+                              </p:par>
+                              <p:par>
+                                <p:cTn id="15" presetID="1" presetClass="entr" presetSubtype="0" fill="hold" grpId="0" nodeType="withEffect">
+                                  <p:stCondLst>
+                                    <p:cond delay="0"/>
+                                  </p:stCondLst>
+                                  <p:childTnLst>
+                                    <p:set>
+                                      <p:cBhvr>
+                                        <p:cTn id="16" dur="1" fill="hold">
+                                          <p:stCondLst>
+                                            <p:cond delay="0"/>
+                                          </p:stCondLst>
+                                        </p:cTn>
+                                        <p:tgtEl>
+                                          <p:spTgt spid="3">
+                                            <p:txEl>
+                                              <p:pRg st="4" end="4"/>
+                                            </p:txEl>
+                                          </p:spTgt>
+                                        </p:tgtEl>
+                                        <p:attrNameLst>
+                                          <p:attrName>style.visibility</p:attrName>
+                                        </p:attrNameLst>
+                                      </p:cBhvr>
+                                      <p:to>
+                                        <p:strVal val="visible"/>
+                                      </p:to>
+                                    </p:set>
+                                  </p:childTnLst>
+                                </p:cTn>
+                              </p:par>
+                            </p:childTnLst>
+                          </p:cTn>
+                        </p:par>
+                      </p:childTnLst>
+                    </p:cTn>
+                  </p:par>
+                  <p:par>
+                    <p:cTn id="17" fill="hold">
+                      <p:stCondLst>
+                        <p:cond delay="indefinite"/>
+                      </p:stCondLst>
+                      <p:childTnLst>
+                        <p:par>
+                          <p:cTn id="18" fill="hold">
+                            <p:stCondLst>
+                              <p:cond delay="0"/>
+                            </p:stCondLst>
+                            <p:childTnLst>
+                              <p:par>
+                                <p:cTn id="19" presetID="1" presetClass="entr" presetSubtype="0" fill="hold" grpId="0" nodeType="clickEffect">
+                                  <p:stCondLst>
+                                    <p:cond delay="0"/>
+                                  </p:stCondLst>
+                                  <p:childTnLst>
+                                    <p:set>
+                                      <p:cBhvr>
+                                        <p:cTn id="20" dur="1" fill="hold">
+                                          <p:stCondLst>
+                                            <p:cond delay="0"/>
+                                          </p:stCondLst>
+                                        </p:cTn>
+                                        <p:tgtEl>
+                                          <p:spTgt spid="3">
+                                            <p:txEl>
+                                              <p:pRg st="5" end="5"/>
+                                            </p:txEl>
+                                          </p:spTgt>
+                                        </p:tgtEl>
+                                        <p:attrNameLst>
+                                          <p:attrName>style.visibility</p:attrName>
+                                        </p:attrNameLst>
+                                      </p:cBhvr>
+                                      <p:to>
+                                        <p:strVal val="visible"/>
+                                      </p:to>
+                                    </p:set>
+                                  </p:childTnLst>
+                                </p:cTn>
+                              </p:par>
+                            </p:childTnLst>
+                          </p:cTn>
+                        </p:par>
+                      </p:childTnLst>
+                    </p:cTn>
+                  </p:par>
+                  <p:par>
+                    <p:cTn id="21" fill="hold">
+                      <p:stCondLst>
+                        <p:cond delay="indefinite"/>
+                      </p:stCondLst>
+                      <p:childTnLst>
+                        <p:par>
+                          <p:cTn id="22" fill="hold">
+                            <p:stCondLst>
+                              <p:cond delay="0"/>
+                            </p:stCondLst>
+                            <p:childTnLst>
+                              <p:par>
+                                <p:cTn id="23" presetID="1" presetClass="entr" presetSubtype="0" fill="hold" grpId="0" nodeType="clickEffect">
+                                  <p:stCondLst>
+                                    <p:cond delay="0"/>
+                                  </p:stCondLst>
+                                  <p:childTnLst>
+                                    <p:set>
+                                      <p:cBhvr>
+                                        <p:cTn id="24" dur="1" fill="hold">
+                                          <p:stCondLst>
+                                            <p:cond delay="0"/>
+                                          </p:stCondLst>
+                                        </p:cTn>
+                                        <p:tgtEl>
+                                          <p:spTgt spid="3">
+                                            <p:txEl>
+                                              <p:pRg st="6" end="6"/>
+                                            </p:txEl>
+                                          </p:spTgt>
+                                        </p:tgtEl>
+                                        <p:attrNameLst>
+                                          <p:attrName>style.visibility</p:attrName>
+                                        </p:attrNameLst>
+                                      </p:cBhvr>
+                                      <p:to>
+                                        <p:strVal val="visible"/>
+                                      </p:to>
+                                    </p:set>
+                                  </p:childTnLst>
+                                </p:cTn>
+                              </p:par>
+                            </p:childTnLst>
+                          </p:cTn>
+                        </p:par>
+                      </p:childTnLst>
+                    </p:cTn>
+                  </p:par>
+                  <p:par>
+                    <p:cTn id="25" fill="hold">
+                      <p:stCondLst>
+                        <p:cond delay="indefinite"/>
+                      </p:stCondLst>
+                      <p:childTnLst>
+                        <p:par>
+                          <p:cTn id="26" fill="hold">
+                            <p:stCondLst>
+                              <p:cond delay="0"/>
+                            </p:stCondLst>
+                            <p:childTnLst>
+                              <p:par>
+                                <p:cTn id="27" presetID="1" presetClass="entr" presetSubtype="0" fill="hold" grpId="0" nodeType="clickEffect">
+                                  <p:stCondLst>
+                                    <p:cond delay="0"/>
+                                  </p:stCondLst>
+                                  <p:childTnLst>
+                                    <p:set>
+                                      <p:cBhvr>
+                                        <p:cTn id="28" dur="1" fill="hold">
+                                          <p:stCondLst>
+                                            <p:cond delay="0"/>
+                                          </p:stCondLst>
+                                        </p:cTn>
+                                        <p:tgtEl>
+                                          <p:spTgt spid="3">
+                                            <p:txEl>
+                                              <p:pRg st="7" end="7"/>
+                                            </p:txEl>
+                                          </p:spTgt>
+                                        </p:tgtEl>
+                                        <p:attrNameLst>
+                                          <p:attrName>style.visibility</p:attrName>
+                                        </p:attrNameLst>
+                                      </p:cBhvr>
+                                      <p:to>
+                                        <p:strVal val="visible"/>
+                                      </p:to>
+                                    </p:set>
+                                  </p:childTnLst>
+                                </p:cTn>
+                              </p:par>
+                            </p:childTnLst>
+                          </p:cTn>
+                        </p:par>
+                      </p:childTnLst>
+                    </p:cTn>
+                  </p:par>
+                  <p:par>
+                    <p:cTn id="29" fill="hold">
+                      <p:stCondLst>
+                        <p:cond delay="indefinite"/>
+                      </p:stCondLst>
+                      <p:childTnLst>
+                        <p:par>
+                          <p:cTn id="30" fill="hold">
+                            <p:stCondLst>
+                              <p:cond delay="0"/>
+                            </p:stCondLst>
+                            <p:childTnLst>
+                              <p:par>
+                                <p:cTn id="31" presetID="1" presetClass="entr" presetSubtype="0" fill="hold" grpId="0" nodeType="clickEffect">
+                                  <p:stCondLst>
+                                    <p:cond delay="0"/>
+                                  </p:stCondLst>
+                                  <p:childTnLst>
+                                    <p:set>
+                                      <p:cBhvr>
+                                        <p:cTn id="32" dur="1" fill="hold">
+                                          <p:stCondLst>
+                                            <p:cond delay="0"/>
+                                          </p:stCondLst>
+                                        </p:cTn>
+                                        <p:tgtEl>
+                                          <p:spTgt spid="3">
+                                            <p:txEl>
+                                              <p:pRg st="8" end="8"/>
+                                            </p:txEl>
+                                          </p:spTgt>
+                                        </p:tgtEl>
+                                        <p:attrNameLst>
+                                          <p:attrName>style.visibility</p:attrName>
+                                        </p:attrNameLst>
+                                      </p:cBhvr>
+                                      <p:to>
+                                        <p:strVal val="visible"/>
+                                      </p:to>
+                                    </p:set>
+                                  </p:childTnLst>
+                                </p:cTn>
+                              </p:par>
+                            </p:childTnLst>
+                          </p:cTn>
+                        </p:par>
+                      </p:childTnLst>
+                    </p:cTn>
+                  </p:par>
+                </p:childTnLst>
+              </p:cTn>
+              <p:prevCondLst>
+                <p:cond evt="onPrev" delay="0">
+                  <p:tgtEl>
+                    <p:sldTgt/>
+                  </p:tgtEl>
+                </p:cond>
+              </p:prevCondLst>
+              <p:nextCondLst>
+                <p:cond evt="onNext" delay="0">
+                  <p:tgtEl>
+                    <p:sldTgt/>
+                  </p:tgtEl>
+                </p:cond>
+              </p:nextCondLst>
+            </p:seq>
+          </p:childTnLst>
+        </p:cTn>
+      </p:par>
+    </p:tnLst>
+    <p:bldLst>
+      <p:bldP spid="3" grpId="0" build="p"/>
+    </p:bldLst>
+  </p:timing>
 </p:sld>
 </file>
 
@@ -4714,6 +5134,778 @@
   <p:clrMapOvr>
     <a:masterClrMapping/>
   </p:clrMapOvr>
+  <p:timing>
+    <p:tnLst>
+      <p:par>
+        <p:cTn id="1" dur="indefinite" restart="never" nodeType="tmRoot">
+          <p:childTnLst>
+            <p:seq concurrent="1" nextAc="seek">
+              <p:cTn id="2" dur="indefinite" nodeType="mainSeq">
+                <p:childTnLst>
+                  <p:par>
+                    <p:cTn id="3" fill="hold">
+                      <p:stCondLst>
+                        <p:cond delay="indefinite"/>
+                      </p:stCondLst>
+                      <p:childTnLst>
+                        <p:par>
+                          <p:cTn id="4" fill="hold">
+                            <p:stCondLst>
+                              <p:cond delay="0"/>
+                            </p:stCondLst>
+                            <p:childTnLst>
+                              <p:par>
+                                <p:cTn id="5" presetID="1" presetClass="entr" presetSubtype="0" fill="hold" grpId="0" nodeType="clickEffect">
+                                  <p:stCondLst>
+                                    <p:cond delay="0"/>
+                                  </p:stCondLst>
+                                  <p:childTnLst>
+                                    <p:set>
+                                      <p:cBhvr>
+                                        <p:cTn id="6" dur="1" fill="hold">
+                                          <p:stCondLst>
+                                            <p:cond delay="0"/>
+                                          </p:stCondLst>
+                                        </p:cTn>
+                                        <p:tgtEl>
+                                          <p:spTgt spid="3">
+                                            <p:txEl>
+                                              <p:pRg st="0" end="0"/>
+                                            </p:txEl>
+                                          </p:spTgt>
+                                        </p:tgtEl>
+                                        <p:attrNameLst>
+                                          <p:attrName>style.visibility</p:attrName>
+                                        </p:attrNameLst>
+                                      </p:cBhvr>
+                                      <p:to>
+                                        <p:strVal val="visible"/>
+                                      </p:to>
+                                    </p:set>
+                                  </p:childTnLst>
+                                </p:cTn>
+                              </p:par>
+                            </p:childTnLst>
+                          </p:cTn>
+                        </p:par>
+                      </p:childTnLst>
+                    </p:cTn>
+                  </p:par>
+                  <p:par>
+                    <p:cTn id="7" fill="hold">
+                      <p:stCondLst>
+                        <p:cond delay="indefinite"/>
+                      </p:stCondLst>
+                      <p:childTnLst>
+                        <p:par>
+                          <p:cTn id="8" fill="hold">
+                            <p:stCondLst>
+                              <p:cond delay="0"/>
+                            </p:stCondLst>
+                            <p:childTnLst>
+                              <p:par>
+                                <p:cTn id="9" presetID="1" presetClass="entr" presetSubtype="0" fill="hold" grpId="0" nodeType="clickEffect">
+                                  <p:stCondLst>
+                                    <p:cond delay="0"/>
+                                  </p:stCondLst>
+                                  <p:childTnLst>
+                                    <p:set>
+                                      <p:cBhvr>
+                                        <p:cTn id="10" dur="1" fill="hold">
+                                          <p:stCondLst>
+                                            <p:cond delay="0"/>
+                                          </p:stCondLst>
+                                        </p:cTn>
+                                        <p:tgtEl>
+                                          <p:spTgt spid="3">
+                                            <p:txEl>
+                                              <p:pRg st="1" end="1"/>
+                                            </p:txEl>
+                                          </p:spTgt>
+                                        </p:tgtEl>
+                                        <p:attrNameLst>
+                                          <p:attrName>style.visibility</p:attrName>
+                                        </p:attrNameLst>
+                                      </p:cBhvr>
+                                      <p:to>
+                                        <p:strVal val="visible"/>
+                                      </p:to>
+                                    </p:set>
+                                  </p:childTnLst>
+                                </p:cTn>
+                              </p:par>
+                              <p:par>
+                                <p:cTn id="11" presetID="1" presetClass="entr" presetSubtype="0" fill="hold" grpId="0" nodeType="withEffect">
+                                  <p:stCondLst>
+                                    <p:cond delay="0"/>
+                                  </p:stCondLst>
+                                  <p:childTnLst>
+                                    <p:set>
+                                      <p:cBhvr>
+                                        <p:cTn id="12" dur="1" fill="hold">
+                                          <p:stCondLst>
+                                            <p:cond delay="0"/>
+                                          </p:stCondLst>
+                                        </p:cTn>
+                                        <p:tgtEl>
+                                          <p:spTgt spid="3">
+                                            <p:txEl>
+                                              <p:pRg st="2" end="2"/>
+                                            </p:txEl>
+                                          </p:spTgt>
+                                        </p:tgtEl>
+                                        <p:attrNameLst>
+                                          <p:attrName>style.visibility</p:attrName>
+                                        </p:attrNameLst>
+                                      </p:cBhvr>
+                                      <p:to>
+                                        <p:strVal val="visible"/>
+                                      </p:to>
+                                    </p:set>
+                                  </p:childTnLst>
+                                </p:cTn>
+                              </p:par>
+                            </p:childTnLst>
+                          </p:cTn>
+                        </p:par>
+                      </p:childTnLst>
+                    </p:cTn>
+                  </p:par>
+                  <p:par>
+                    <p:cTn id="13" fill="hold">
+                      <p:stCondLst>
+                        <p:cond delay="indefinite"/>
+                      </p:stCondLst>
+                      <p:childTnLst>
+                        <p:par>
+                          <p:cTn id="14" fill="hold">
+                            <p:stCondLst>
+                              <p:cond delay="0"/>
+                            </p:stCondLst>
+                            <p:childTnLst>
+                              <p:par>
+                                <p:cTn id="15" presetID="1" presetClass="entr" presetSubtype="0" fill="hold" grpId="0" nodeType="clickEffect">
+                                  <p:stCondLst>
+                                    <p:cond delay="0"/>
+                                  </p:stCondLst>
+                                  <p:childTnLst>
+                                    <p:set>
+                                      <p:cBhvr>
+                                        <p:cTn id="16" dur="1" fill="hold">
+                                          <p:stCondLst>
+                                            <p:cond delay="0"/>
+                                          </p:stCondLst>
+                                        </p:cTn>
+                                        <p:tgtEl>
+                                          <p:spTgt spid="3">
+                                            <p:txEl>
+                                              <p:pRg st="3" end="3"/>
+                                            </p:txEl>
+                                          </p:spTgt>
+                                        </p:tgtEl>
+                                        <p:attrNameLst>
+                                          <p:attrName>style.visibility</p:attrName>
+                                        </p:attrNameLst>
+                                      </p:cBhvr>
+                                      <p:to>
+                                        <p:strVal val="visible"/>
+                                      </p:to>
+                                    </p:set>
+                                  </p:childTnLst>
+                                </p:cTn>
+                              </p:par>
+                            </p:childTnLst>
+                          </p:cTn>
+                        </p:par>
+                      </p:childTnLst>
+                    </p:cTn>
+                  </p:par>
+                  <p:par>
+                    <p:cTn id="17" fill="hold">
+                      <p:stCondLst>
+                        <p:cond delay="indefinite"/>
+                      </p:stCondLst>
+                      <p:childTnLst>
+                        <p:par>
+                          <p:cTn id="18" fill="hold">
+                            <p:stCondLst>
+                              <p:cond delay="0"/>
+                            </p:stCondLst>
+                            <p:childTnLst>
+                              <p:par>
+                                <p:cTn id="19" presetID="1" presetClass="entr" presetSubtype="0" fill="hold" grpId="0" nodeType="clickEffect">
+                                  <p:stCondLst>
+                                    <p:cond delay="0"/>
+                                  </p:stCondLst>
+                                  <p:childTnLst>
+                                    <p:set>
+                                      <p:cBhvr>
+                                        <p:cTn id="20" dur="1" fill="hold">
+                                          <p:stCondLst>
+                                            <p:cond delay="0"/>
+                                          </p:stCondLst>
+                                        </p:cTn>
+                                        <p:tgtEl>
+                                          <p:spTgt spid="3">
+                                            <p:txEl>
+                                              <p:pRg st="4" end="4"/>
+                                            </p:txEl>
+                                          </p:spTgt>
+                                        </p:tgtEl>
+                                        <p:attrNameLst>
+                                          <p:attrName>style.visibility</p:attrName>
+                                        </p:attrNameLst>
+                                      </p:cBhvr>
+                                      <p:to>
+                                        <p:strVal val="visible"/>
+                                      </p:to>
+                                    </p:set>
+                                  </p:childTnLst>
+                                </p:cTn>
+                              </p:par>
+                              <p:par>
+                                <p:cTn id="21" presetID="1" presetClass="entr" presetSubtype="0" fill="hold" grpId="0" nodeType="withEffect">
+                                  <p:stCondLst>
+                                    <p:cond delay="0"/>
+                                  </p:stCondLst>
+                                  <p:childTnLst>
+                                    <p:set>
+                                      <p:cBhvr>
+                                        <p:cTn id="22" dur="1" fill="hold">
+                                          <p:stCondLst>
+                                            <p:cond delay="0"/>
+                                          </p:stCondLst>
+                                        </p:cTn>
+                                        <p:tgtEl>
+                                          <p:spTgt spid="3">
+                                            <p:txEl>
+                                              <p:pRg st="5" end="5"/>
+                                            </p:txEl>
+                                          </p:spTgt>
+                                        </p:tgtEl>
+                                        <p:attrNameLst>
+                                          <p:attrName>style.visibility</p:attrName>
+                                        </p:attrNameLst>
+                                      </p:cBhvr>
+                                      <p:to>
+                                        <p:strVal val="visible"/>
+                                      </p:to>
+                                    </p:set>
+                                  </p:childTnLst>
+                                </p:cTn>
+                              </p:par>
+                            </p:childTnLst>
+                          </p:cTn>
+                        </p:par>
+                      </p:childTnLst>
+                    </p:cTn>
+                  </p:par>
+                  <p:par>
+                    <p:cTn id="23" fill="hold">
+                      <p:stCondLst>
+                        <p:cond delay="indefinite"/>
+                      </p:stCondLst>
+                      <p:childTnLst>
+                        <p:par>
+                          <p:cTn id="24" fill="hold">
+                            <p:stCondLst>
+                              <p:cond delay="0"/>
+                            </p:stCondLst>
+                            <p:childTnLst>
+                              <p:par>
+                                <p:cTn id="25" presetID="1" presetClass="entr" presetSubtype="0" fill="hold" grpId="0" nodeType="clickEffect">
+                                  <p:stCondLst>
+                                    <p:cond delay="0"/>
+                                  </p:stCondLst>
+                                  <p:childTnLst>
+                                    <p:set>
+                                      <p:cBhvr>
+                                        <p:cTn id="26" dur="1" fill="hold">
+                                          <p:stCondLst>
+                                            <p:cond delay="0"/>
+                                          </p:stCondLst>
+                                        </p:cTn>
+                                        <p:tgtEl>
+                                          <p:spTgt spid="3">
+                                            <p:txEl>
+                                              <p:pRg st="6" end="6"/>
+                                            </p:txEl>
+                                          </p:spTgt>
+                                        </p:tgtEl>
+                                        <p:attrNameLst>
+                                          <p:attrName>style.visibility</p:attrName>
+                                        </p:attrNameLst>
+                                      </p:cBhvr>
+                                      <p:to>
+                                        <p:strVal val="visible"/>
+                                      </p:to>
+                                    </p:set>
+                                  </p:childTnLst>
+                                </p:cTn>
+                              </p:par>
+                            </p:childTnLst>
+                          </p:cTn>
+                        </p:par>
+                      </p:childTnLst>
+                    </p:cTn>
+                  </p:par>
+                  <p:par>
+                    <p:cTn id="27" fill="hold">
+                      <p:stCondLst>
+                        <p:cond delay="indefinite"/>
+                      </p:stCondLst>
+                      <p:childTnLst>
+                        <p:par>
+                          <p:cTn id="28" fill="hold">
+                            <p:stCondLst>
+                              <p:cond delay="0"/>
+                            </p:stCondLst>
+                            <p:childTnLst>
+                              <p:par>
+                                <p:cTn id="29" presetID="1" presetClass="entr" presetSubtype="0" fill="hold" grpId="0" nodeType="clickEffect">
+                                  <p:stCondLst>
+                                    <p:cond delay="0"/>
+                                  </p:stCondLst>
+                                  <p:childTnLst>
+                                    <p:set>
+                                      <p:cBhvr>
+                                        <p:cTn id="30" dur="1" fill="hold">
+                                          <p:stCondLst>
+                                            <p:cond delay="0"/>
+                                          </p:stCondLst>
+                                        </p:cTn>
+                                        <p:tgtEl>
+                                          <p:spTgt spid="4">
+                                            <p:txEl>
+                                              <p:pRg st="0" end="0"/>
+                                            </p:txEl>
+                                          </p:spTgt>
+                                        </p:tgtEl>
+                                        <p:attrNameLst>
+                                          <p:attrName>style.visibility</p:attrName>
+                                        </p:attrNameLst>
+                                      </p:cBhvr>
+                                      <p:to>
+                                        <p:strVal val="visible"/>
+                                      </p:to>
+                                    </p:set>
+                                  </p:childTnLst>
+                                </p:cTn>
+                              </p:par>
+                            </p:childTnLst>
+                          </p:cTn>
+                        </p:par>
+                      </p:childTnLst>
+                    </p:cTn>
+                  </p:par>
+                  <p:par>
+                    <p:cTn id="31" fill="hold">
+                      <p:stCondLst>
+                        <p:cond delay="indefinite"/>
+                      </p:stCondLst>
+                      <p:childTnLst>
+                        <p:par>
+                          <p:cTn id="32" fill="hold">
+                            <p:stCondLst>
+                              <p:cond delay="0"/>
+                            </p:stCondLst>
+                            <p:childTnLst>
+                              <p:par>
+                                <p:cTn id="33" presetID="1" presetClass="entr" presetSubtype="0" fill="hold" grpId="0" nodeType="clickEffect">
+                                  <p:stCondLst>
+                                    <p:cond delay="0"/>
+                                  </p:stCondLst>
+                                  <p:childTnLst>
+                                    <p:set>
+                                      <p:cBhvr>
+                                        <p:cTn id="34" dur="1" fill="hold">
+                                          <p:stCondLst>
+                                            <p:cond delay="0"/>
+                                          </p:stCondLst>
+                                        </p:cTn>
+                                        <p:tgtEl>
+                                          <p:spTgt spid="4">
+                                            <p:txEl>
+                                              <p:pRg st="1" end="1"/>
+                                            </p:txEl>
+                                          </p:spTgt>
+                                        </p:tgtEl>
+                                        <p:attrNameLst>
+                                          <p:attrName>style.visibility</p:attrName>
+                                        </p:attrNameLst>
+                                      </p:cBhvr>
+                                      <p:to>
+                                        <p:strVal val="visible"/>
+                                      </p:to>
+                                    </p:set>
+                                  </p:childTnLst>
+                                </p:cTn>
+                              </p:par>
+                              <p:par>
+                                <p:cTn id="35" presetID="1" presetClass="entr" presetSubtype="0" fill="hold" grpId="0" nodeType="withEffect">
+                                  <p:stCondLst>
+                                    <p:cond delay="0"/>
+                                  </p:stCondLst>
+                                  <p:childTnLst>
+                                    <p:set>
+                                      <p:cBhvr>
+                                        <p:cTn id="36" dur="1" fill="hold">
+                                          <p:stCondLst>
+                                            <p:cond delay="0"/>
+                                          </p:stCondLst>
+                                        </p:cTn>
+                                        <p:tgtEl>
+                                          <p:spTgt spid="4">
+                                            <p:txEl>
+                                              <p:pRg st="2" end="2"/>
+                                            </p:txEl>
+                                          </p:spTgt>
+                                        </p:tgtEl>
+                                        <p:attrNameLst>
+                                          <p:attrName>style.visibility</p:attrName>
+                                        </p:attrNameLst>
+                                      </p:cBhvr>
+                                      <p:to>
+                                        <p:strVal val="visible"/>
+                                      </p:to>
+                                    </p:set>
+                                  </p:childTnLst>
+                                </p:cTn>
+                              </p:par>
+                              <p:par>
+                                <p:cTn id="37" presetID="1" presetClass="entr" presetSubtype="0" fill="hold" grpId="0" nodeType="withEffect">
+                                  <p:stCondLst>
+                                    <p:cond delay="0"/>
+                                  </p:stCondLst>
+                                  <p:childTnLst>
+                                    <p:set>
+                                      <p:cBhvr>
+                                        <p:cTn id="38" dur="1" fill="hold">
+                                          <p:stCondLst>
+                                            <p:cond delay="0"/>
+                                          </p:stCondLst>
+                                        </p:cTn>
+                                        <p:tgtEl>
+                                          <p:spTgt spid="4">
+                                            <p:txEl>
+                                              <p:pRg st="3" end="3"/>
+                                            </p:txEl>
+                                          </p:spTgt>
+                                        </p:tgtEl>
+                                        <p:attrNameLst>
+                                          <p:attrName>style.visibility</p:attrName>
+                                        </p:attrNameLst>
+                                      </p:cBhvr>
+                                      <p:to>
+                                        <p:strVal val="visible"/>
+                                      </p:to>
+                                    </p:set>
+                                  </p:childTnLst>
+                                </p:cTn>
+                              </p:par>
+                            </p:childTnLst>
+                          </p:cTn>
+                        </p:par>
+                      </p:childTnLst>
+                    </p:cTn>
+                  </p:par>
+                  <p:par>
+                    <p:cTn id="39" fill="hold">
+                      <p:stCondLst>
+                        <p:cond delay="indefinite"/>
+                      </p:stCondLst>
+                      <p:childTnLst>
+                        <p:par>
+                          <p:cTn id="40" fill="hold">
+                            <p:stCondLst>
+                              <p:cond delay="0"/>
+                            </p:stCondLst>
+                            <p:childTnLst>
+                              <p:par>
+                                <p:cTn id="41" presetID="1" presetClass="entr" presetSubtype="0" fill="hold" grpId="0" nodeType="clickEffect">
+                                  <p:stCondLst>
+                                    <p:cond delay="0"/>
+                                  </p:stCondLst>
+                                  <p:childTnLst>
+                                    <p:set>
+                                      <p:cBhvr>
+                                        <p:cTn id="42" dur="1" fill="hold">
+                                          <p:stCondLst>
+                                            <p:cond delay="0"/>
+                                          </p:stCondLst>
+                                        </p:cTn>
+                                        <p:tgtEl>
+                                          <p:spTgt spid="4">
+                                            <p:txEl>
+                                              <p:pRg st="4" end="4"/>
+                                            </p:txEl>
+                                          </p:spTgt>
+                                        </p:tgtEl>
+                                        <p:attrNameLst>
+                                          <p:attrName>style.visibility</p:attrName>
+                                        </p:attrNameLst>
+                                      </p:cBhvr>
+                                      <p:to>
+                                        <p:strVal val="visible"/>
+                                      </p:to>
+                                    </p:set>
+                                  </p:childTnLst>
+                                </p:cTn>
+                              </p:par>
+                              <p:par>
+                                <p:cTn id="43" presetID="1" presetClass="entr" presetSubtype="0" fill="hold" grpId="0" nodeType="withEffect">
+                                  <p:stCondLst>
+                                    <p:cond delay="0"/>
+                                  </p:stCondLst>
+                                  <p:childTnLst>
+                                    <p:set>
+                                      <p:cBhvr>
+                                        <p:cTn id="44" dur="1" fill="hold">
+                                          <p:stCondLst>
+                                            <p:cond delay="0"/>
+                                          </p:stCondLst>
+                                        </p:cTn>
+                                        <p:tgtEl>
+                                          <p:spTgt spid="4">
+                                            <p:txEl>
+                                              <p:pRg st="5" end="5"/>
+                                            </p:txEl>
+                                          </p:spTgt>
+                                        </p:tgtEl>
+                                        <p:attrNameLst>
+                                          <p:attrName>style.visibility</p:attrName>
+                                        </p:attrNameLst>
+                                      </p:cBhvr>
+                                      <p:to>
+                                        <p:strVal val="visible"/>
+                                      </p:to>
+                                    </p:set>
+                                  </p:childTnLst>
+                                </p:cTn>
+                              </p:par>
+                              <p:par>
+                                <p:cTn id="45" presetID="1" presetClass="entr" presetSubtype="0" fill="hold" grpId="0" nodeType="withEffect">
+                                  <p:stCondLst>
+                                    <p:cond delay="0"/>
+                                  </p:stCondLst>
+                                  <p:childTnLst>
+                                    <p:set>
+                                      <p:cBhvr>
+                                        <p:cTn id="46" dur="1" fill="hold">
+                                          <p:stCondLst>
+                                            <p:cond delay="0"/>
+                                          </p:stCondLst>
+                                        </p:cTn>
+                                        <p:tgtEl>
+                                          <p:spTgt spid="4">
+                                            <p:txEl>
+                                              <p:pRg st="6" end="6"/>
+                                            </p:txEl>
+                                          </p:spTgt>
+                                        </p:tgtEl>
+                                        <p:attrNameLst>
+                                          <p:attrName>style.visibility</p:attrName>
+                                        </p:attrNameLst>
+                                      </p:cBhvr>
+                                      <p:to>
+                                        <p:strVal val="visible"/>
+                                      </p:to>
+                                    </p:set>
+                                  </p:childTnLst>
+                                </p:cTn>
+                              </p:par>
+                            </p:childTnLst>
+                          </p:cTn>
+                        </p:par>
+                      </p:childTnLst>
+                    </p:cTn>
+                  </p:par>
+                  <p:par>
+                    <p:cTn id="47" fill="hold">
+                      <p:stCondLst>
+                        <p:cond delay="indefinite"/>
+                      </p:stCondLst>
+                      <p:childTnLst>
+                        <p:par>
+                          <p:cTn id="48" fill="hold">
+                            <p:stCondLst>
+                              <p:cond delay="0"/>
+                            </p:stCondLst>
+                            <p:childTnLst>
+                              <p:par>
+                                <p:cTn id="49" presetID="1" presetClass="entr" presetSubtype="0" fill="hold" grpId="0" nodeType="clickEffect">
+                                  <p:stCondLst>
+                                    <p:cond delay="0"/>
+                                  </p:stCondLst>
+                                  <p:childTnLst>
+                                    <p:set>
+                                      <p:cBhvr>
+                                        <p:cTn id="50" dur="1" fill="hold">
+                                          <p:stCondLst>
+                                            <p:cond delay="0"/>
+                                          </p:stCondLst>
+                                        </p:cTn>
+                                        <p:tgtEl>
+                                          <p:spTgt spid="4">
+                                            <p:txEl>
+                                              <p:pRg st="7" end="7"/>
+                                            </p:txEl>
+                                          </p:spTgt>
+                                        </p:tgtEl>
+                                        <p:attrNameLst>
+                                          <p:attrName>style.visibility</p:attrName>
+                                        </p:attrNameLst>
+                                      </p:cBhvr>
+                                      <p:to>
+                                        <p:strVal val="visible"/>
+                                      </p:to>
+                                    </p:set>
+                                  </p:childTnLst>
+                                </p:cTn>
+                              </p:par>
+                              <p:par>
+                                <p:cTn id="51" presetID="1" presetClass="entr" presetSubtype="0" fill="hold" grpId="0" nodeType="withEffect">
+                                  <p:stCondLst>
+                                    <p:cond delay="0"/>
+                                  </p:stCondLst>
+                                  <p:childTnLst>
+                                    <p:set>
+                                      <p:cBhvr>
+                                        <p:cTn id="52" dur="1" fill="hold">
+                                          <p:stCondLst>
+                                            <p:cond delay="0"/>
+                                          </p:stCondLst>
+                                        </p:cTn>
+                                        <p:tgtEl>
+                                          <p:spTgt spid="4">
+                                            <p:txEl>
+                                              <p:pRg st="8" end="8"/>
+                                            </p:txEl>
+                                          </p:spTgt>
+                                        </p:tgtEl>
+                                        <p:attrNameLst>
+                                          <p:attrName>style.visibility</p:attrName>
+                                        </p:attrNameLst>
+                                      </p:cBhvr>
+                                      <p:to>
+                                        <p:strVal val="visible"/>
+                                      </p:to>
+                                    </p:set>
+                                  </p:childTnLst>
+                                </p:cTn>
+                              </p:par>
+                              <p:par>
+                                <p:cTn id="53" presetID="1" presetClass="entr" presetSubtype="0" fill="hold" grpId="0" nodeType="withEffect">
+                                  <p:stCondLst>
+                                    <p:cond delay="0"/>
+                                  </p:stCondLst>
+                                  <p:childTnLst>
+                                    <p:set>
+                                      <p:cBhvr>
+                                        <p:cTn id="54" dur="1" fill="hold">
+                                          <p:stCondLst>
+                                            <p:cond delay="0"/>
+                                          </p:stCondLst>
+                                        </p:cTn>
+                                        <p:tgtEl>
+                                          <p:spTgt spid="4">
+                                            <p:txEl>
+                                              <p:pRg st="9" end="9"/>
+                                            </p:txEl>
+                                          </p:spTgt>
+                                        </p:tgtEl>
+                                        <p:attrNameLst>
+                                          <p:attrName>style.visibility</p:attrName>
+                                        </p:attrNameLst>
+                                      </p:cBhvr>
+                                      <p:to>
+                                        <p:strVal val="visible"/>
+                                      </p:to>
+                                    </p:set>
+                                  </p:childTnLst>
+                                </p:cTn>
+                              </p:par>
+                            </p:childTnLst>
+                          </p:cTn>
+                        </p:par>
+                      </p:childTnLst>
+                    </p:cTn>
+                  </p:par>
+                  <p:par>
+                    <p:cTn id="55" fill="hold">
+                      <p:stCondLst>
+                        <p:cond delay="indefinite"/>
+                      </p:stCondLst>
+                      <p:childTnLst>
+                        <p:par>
+                          <p:cTn id="56" fill="hold">
+                            <p:stCondLst>
+                              <p:cond delay="0"/>
+                            </p:stCondLst>
+                            <p:childTnLst>
+                              <p:par>
+                                <p:cTn id="57" presetID="1" presetClass="entr" presetSubtype="0" fill="hold" grpId="0" nodeType="clickEffect">
+                                  <p:stCondLst>
+                                    <p:cond delay="0"/>
+                                  </p:stCondLst>
+                                  <p:childTnLst>
+                                    <p:set>
+                                      <p:cBhvr>
+                                        <p:cTn id="58" dur="1" fill="hold">
+                                          <p:stCondLst>
+                                            <p:cond delay="0"/>
+                                          </p:stCondLst>
+                                        </p:cTn>
+                                        <p:tgtEl>
+                                          <p:spTgt spid="4">
+                                            <p:txEl>
+                                              <p:pRg st="10" end="10"/>
+                                            </p:txEl>
+                                          </p:spTgt>
+                                        </p:tgtEl>
+                                        <p:attrNameLst>
+                                          <p:attrName>style.visibility</p:attrName>
+                                        </p:attrNameLst>
+                                      </p:cBhvr>
+                                      <p:to>
+                                        <p:strVal val="visible"/>
+                                      </p:to>
+                                    </p:set>
+                                  </p:childTnLst>
+                                </p:cTn>
+                              </p:par>
+                            </p:childTnLst>
+                          </p:cTn>
+                        </p:par>
+                      </p:childTnLst>
+                    </p:cTn>
+                  </p:par>
+                </p:childTnLst>
+              </p:cTn>
+              <p:prevCondLst>
+                <p:cond evt="onPrev" delay="0">
+                  <p:tgtEl>
+                    <p:sldTgt/>
+                  </p:tgtEl>
+                </p:cond>
+              </p:prevCondLst>
+              <p:nextCondLst>
+                <p:cond evt="onNext" delay="0">
+                  <p:tgtEl>
+                    <p:sldTgt/>
+                  </p:tgtEl>
+                </p:cond>
+              </p:nextCondLst>
+            </p:seq>
+          </p:childTnLst>
+        </p:cTn>
+      </p:par>
+    </p:tnLst>
+    <p:bldLst>
+      <p:bldP spid="3" grpId="0" build="p" bldLvl="2"/>
+      <p:bldP spid="4" grpId="0" build="p" bldLvl="2"/>
+    </p:bldLst>
+  </p:timing>
 </p:sld>
 </file>
 
@@ -5035,6 +6227,488 @@
   <p:clrMapOvr>
     <a:masterClrMapping/>
   </p:clrMapOvr>
+  <p:timing>
+    <p:tnLst>
+      <p:par>
+        <p:cTn id="1" dur="indefinite" restart="never" nodeType="tmRoot">
+          <p:childTnLst>
+            <p:seq concurrent="1" nextAc="seek">
+              <p:cTn id="2" dur="indefinite" nodeType="mainSeq">
+                <p:childTnLst>
+                  <p:par>
+                    <p:cTn id="3" fill="hold">
+                      <p:stCondLst>
+                        <p:cond delay="indefinite"/>
+                      </p:stCondLst>
+                      <p:childTnLst>
+                        <p:par>
+                          <p:cTn id="4" fill="hold">
+                            <p:stCondLst>
+                              <p:cond delay="0"/>
+                            </p:stCondLst>
+                            <p:childTnLst>
+                              <p:par>
+                                <p:cTn id="5" presetID="1" presetClass="entr" presetSubtype="0" fill="hold" grpId="0" nodeType="clickEffect">
+                                  <p:stCondLst>
+                                    <p:cond delay="0"/>
+                                  </p:stCondLst>
+                                  <p:childTnLst>
+                                    <p:set>
+                                      <p:cBhvr>
+                                        <p:cTn id="6" dur="1" fill="hold">
+                                          <p:stCondLst>
+                                            <p:cond delay="0"/>
+                                          </p:stCondLst>
+                                        </p:cTn>
+                                        <p:tgtEl>
+                                          <p:spTgt spid="3">
+                                            <p:txEl>
+                                              <p:pRg st="0" end="0"/>
+                                            </p:txEl>
+                                          </p:spTgt>
+                                        </p:tgtEl>
+                                        <p:attrNameLst>
+                                          <p:attrName>style.visibility</p:attrName>
+                                        </p:attrNameLst>
+                                      </p:cBhvr>
+                                      <p:to>
+                                        <p:strVal val="visible"/>
+                                      </p:to>
+                                    </p:set>
+                                  </p:childTnLst>
+                                </p:cTn>
+                              </p:par>
+                            </p:childTnLst>
+                          </p:cTn>
+                        </p:par>
+                      </p:childTnLst>
+                    </p:cTn>
+                  </p:par>
+                  <p:par>
+                    <p:cTn id="7" fill="hold">
+                      <p:stCondLst>
+                        <p:cond delay="indefinite"/>
+                      </p:stCondLst>
+                      <p:childTnLst>
+                        <p:par>
+                          <p:cTn id="8" fill="hold">
+                            <p:stCondLst>
+                              <p:cond delay="0"/>
+                            </p:stCondLst>
+                            <p:childTnLst>
+                              <p:par>
+                                <p:cTn id="9" presetID="1" presetClass="entr" presetSubtype="0" fill="hold" grpId="0" nodeType="clickEffect">
+                                  <p:stCondLst>
+                                    <p:cond delay="0"/>
+                                  </p:stCondLst>
+                                  <p:childTnLst>
+                                    <p:set>
+                                      <p:cBhvr>
+                                        <p:cTn id="10" dur="1" fill="hold">
+                                          <p:stCondLst>
+                                            <p:cond delay="0"/>
+                                          </p:stCondLst>
+                                        </p:cTn>
+                                        <p:tgtEl>
+                                          <p:spTgt spid="3">
+                                            <p:txEl>
+                                              <p:pRg st="1" end="1"/>
+                                            </p:txEl>
+                                          </p:spTgt>
+                                        </p:tgtEl>
+                                        <p:attrNameLst>
+                                          <p:attrName>style.visibility</p:attrName>
+                                        </p:attrNameLst>
+                                      </p:cBhvr>
+                                      <p:to>
+                                        <p:strVal val="visible"/>
+                                      </p:to>
+                                    </p:set>
+                                  </p:childTnLst>
+                                </p:cTn>
+                              </p:par>
+                            </p:childTnLst>
+                          </p:cTn>
+                        </p:par>
+                      </p:childTnLst>
+                    </p:cTn>
+                  </p:par>
+                  <p:par>
+                    <p:cTn id="11" fill="hold">
+                      <p:stCondLst>
+                        <p:cond delay="indefinite"/>
+                      </p:stCondLst>
+                      <p:childTnLst>
+                        <p:par>
+                          <p:cTn id="12" fill="hold">
+                            <p:stCondLst>
+                              <p:cond delay="0"/>
+                            </p:stCondLst>
+                            <p:childTnLst>
+                              <p:par>
+                                <p:cTn id="13" presetID="1" presetClass="entr" presetSubtype="0" fill="hold" grpId="0" nodeType="clickEffect">
+                                  <p:stCondLst>
+                                    <p:cond delay="0"/>
+                                  </p:stCondLst>
+                                  <p:childTnLst>
+                                    <p:set>
+                                      <p:cBhvr>
+                                        <p:cTn id="14" dur="1" fill="hold">
+                                          <p:stCondLst>
+                                            <p:cond delay="0"/>
+                                          </p:stCondLst>
+                                        </p:cTn>
+                                        <p:tgtEl>
+                                          <p:spTgt spid="3">
+                                            <p:txEl>
+                                              <p:pRg st="2" end="2"/>
+                                            </p:txEl>
+                                          </p:spTgt>
+                                        </p:tgtEl>
+                                        <p:attrNameLst>
+                                          <p:attrName>style.visibility</p:attrName>
+                                        </p:attrNameLst>
+                                      </p:cBhvr>
+                                      <p:to>
+                                        <p:strVal val="visible"/>
+                                      </p:to>
+                                    </p:set>
+                                  </p:childTnLst>
+                                </p:cTn>
+                              </p:par>
+                            </p:childTnLst>
+                          </p:cTn>
+                        </p:par>
+                      </p:childTnLst>
+                    </p:cTn>
+                  </p:par>
+                  <p:par>
+                    <p:cTn id="15" fill="hold">
+                      <p:stCondLst>
+                        <p:cond delay="indefinite"/>
+                      </p:stCondLst>
+                      <p:childTnLst>
+                        <p:par>
+                          <p:cTn id="16" fill="hold">
+                            <p:stCondLst>
+                              <p:cond delay="0"/>
+                            </p:stCondLst>
+                            <p:childTnLst>
+                              <p:par>
+                                <p:cTn id="17" presetID="1" presetClass="entr" presetSubtype="0" fill="hold" grpId="0" nodeType="clickEffect">
+                                  <p:stCondLst>
+                                    <p:cond delay="0"/>
+                                  </p:stCondLst>
+                                  <p:childTnLst>
+                                    <p:set>
+                                      <p:cBhvr>
+                                        <p:cTn id="18" dur="1" fill="hold">
+                                          <p:stCondLst>
+                                            <p:cond delay="0"/>
+                                          </p:stCondLst>
+                                        </p:cTn>
+                                        <p:tgtEl>
+                                          <p:spTgt spid="3">
+                                            <p:txEl>
+                                              <p:pRg st="3" end="3"/>
+                                            </p:txEl>
+                                          </p:spTgt>
+                                        </p:tgtEl>
+                                        <p:attrNameLst>
+                                          <p:attrName>style.visibility</p:attrName>
+                                        </p:attrNameLst>
+                                      </p:cBhvr>
+                                      <p:to>
+                                        <p:strVal val="visible"/>
+                                      </p:to>
+                                    </p:set>
+                                  </p:childTnLst>
+                                </p:cTn>
+                              </p:par>
+                            </p:childTnLst>
+                          </p:cTn>
+                        </p:par>
+                      </p:childTnLst>
+                    </p:cTn>
+                  </p:par>
+                  <p:par>
+                    <p:cTn id="19" fill="hold">
+                      <p:stCondLst>
+                        <p:cond delay="indefinite"/>
+                      </p:stCondLst>
+                      <p:childTnLst>
+                        <p:par>
+                          <p:cTn id="20" fill="hold">
+                            <p:stCondLst>
+                              <p:cond delay="0"/>
+                            </p:stCondLst>
+                            <p:childTnLst>
+                              <p:par>
+                                <p:cTn id="21" presetID="1" presetClass="entr" presetSubtype="0" fill="hold" grpId="0" nodeType="clickEffect">
+                                  <p:stCondLst>
+                                    <p:cond delay="0"/>
+                                  </p:stCondLst>
+                                  <p:childTnLst>
+                                    <p:set>
+                                      <p:cBhvr>
+                                        <p:cTn id="22" dur="1" fill="hold">
+                                          <p:stCondLst>
+                                            <p:cond delay="0"/>
+                                          </p:stCondLst>
+                                        </p:cTn>
+                                        <p:tgtEl>
+                                          <p:spTgt spid="3">
+                                            <p:txEl>
+                                              <p:pRg st="4" end="4"/>
+                                            </p:txEl>
+                                          </p:spTgt>
+                                        </p:tgtEl>
+                                        <p:attrNameLst>
+                                          <p:attrName>style.visibility</p:attrName>
+                                        </p:attrNameLst>
+                                      </p:cBhvr>
+                                      <p:to>
+                                        <p:strVal val="visible"/>
+                                      </p:to>
+                                    </p:set>
+                                  </p:childTnLst>
+                                </p:cTn>
+                              </p:par>
+                            </p:childTnLst>
+                          </p:cTn>
+                        </p:par>
+                      </p:childTnLst>
+                    </p:cTn>
+                  </p:par>
+                  <p:par>
+                    <p:cTn id="23" fill="hold">
+                      <p:stCondLst>
+                        <p:cond delay="indefinite"/>
+                      </p:stCondLst>
+                      <p:childTnLst>
+                        <p:par>
+                          <p:cTn id="24" fill="hold">
+                            <p:stCondLst>
+                              <p:cond delay="0"/>
+                            </p:stCondLst>
+                            <p:childTnLst>
+                              <p:par>
+                                <p:cTn id="25" presetID="1" presetClass="entr" presetSubtype="0" fill="hold" grpId="0" nodeType="clickEffect">
+                                  <p:stCondLst>
+                                    <p:cond delay="0"/>
+                                  </p:stCondLst>
+                                  <p:childTnLst>
+                                    <p:set>
+                                      <p:cBhvr>
+                                        <p:cTn id="26" dur="1" fill="hold">
+                                          <p:stCondLst>
+                                            <p:cond delay="0"/>
+                                          </p:stCondLst>
+                                        </p:cTn>
+                                        <p:tgtEl>
+                                          <p:spTgt spid="3">
+                                            <p:txEl>
+                                              <p:pRg st="5" end="5"/>
+                                            </p:txEl>
+                                          </p:spTgt>
+                                        </p:tgtEl>
+                                        <p:attrNameLst>
+                                          <p:attrName>style.visibility</p:attrName>
+                                        </p:attrNameLst>
+                                      </p:cBhvr>
+                                      <p:to>
+                                        <p:strVal val="visible"/>
+                                      </p:to>
+                                    </p:set>
+                                  </p:childTnLst>
+                                </p:cTn>
+                              </p:par>
+                              <p:par>
+                                <p:cTn id="27" presetID="1" presetClass="entr" presetSubtype="0" fill="hold" grpId="0" nodeType="withEffect">
+                                  <p:stCondLst>
+                                    <p:cond delay="0"/>
+                                  </p:stCondLst>
+                                  <p:childTnLst>
+                                    <p:set>
+                                      <p:cBhvr>
+                                        <p:cTn id="28" dur="1" fill="hold">
+                                          <p:stCondLst>
+                                            <p:cond delay="0"/>
+                                          </p:stCondLst>
+                                        </p:cTn>
+                                        <p:tgtEl>
+                                          <p:spTgt spid="3">
+                                            <p:txEl>
+                                              <p:pRg st="6" end="6"/>
+                                            </p:txEl>
+                                          </p:spTgt>
+                                        </p:tgtEl>
+                                        <p:attrNameLst>
+                                          <p:attrName>style.visibility</p:attrName>
+                                        </p:attrNameLst>
+                                      </p:cBhvr>
+                                      <p:to>
+                                        <p:strVal val="visible"/>
+                                      </p:to>
+                                    </p:set>
+                                  </p:childTnLst>
+                                </p:cTn>
+                              </p:par>
+                              <p:par>
+                                <p:cTn id="29" presetID="1" presetClass="entr" presetSubtype="0" fill="hold" grpId="0" nodeType="withEffect">
+                                  <p:stCondLst>
+                                    <p:cond delay="0"/>
+                                  </p:stCondLst>
+                                  <p:childTnLst>
+                                    <p:set>
+                                      <p:cBhvr>
+                                        <p:cTn id="30" dur="1" fill="hold">
+                                          <p:stCondLst>
+                                            <p:cond delay="0"/>
+                                          </p:stCondLst>
+                                        </p:cTn>
+                                        <p:tgtEl>
+                                          <p:spTgt spid="3">
+                                            <p:txEl>
+                                              <p:pRg st="7" end="7"/>
+                                            </p:txEl>
+                                          </p:spTgt>
+                                        </p:tgtEl>
+                                        <p:attrNameLst>
+                                          <p:attrName>style.visibility</p:attrName>
+                                        </p:attrNameLst>
+                                      </p:cBhvr>
+                                      <p:to>
+                                        <p:strVal val="visible"/>
+                                      </p:to>
+                                    </p:set>
+                                  </p:childTnLst>
+                                </p:cTn>
+                              </p:par>
+                              <p:par>
+                                <p:cTn id="31" presetID="1" presetClass="entr" presetSubtype="0" fill="hold" grpId="0" nodeType="withEffect">
+                                  <p:stCondLst>
+                                    <p:cond delay="0"/>
+                                  </p:stCondLst>
+                                  <p:childTnLst>
+                                    <p:set>
+                                      <p:cBhvr>
+                                        <p:cTn id="32" dur="1" fill="hold">
+                                          <p:stCondLst>
+                                            <p:cond delay="0"/>
+                                          </p:stCondLst>
+                                        </p:cTn>
+                                        <p:tgtEl>
+                                          <p:spTgt spid="3">
+                                            <p:txEl>
+                                              <p:pRg st="8" end="8"/>
+                                            </p:txEl>
+                                          </p:spTgt>
+                                        </p:tgtEl>
+                                        <p:attrNameLst>
+                                          <p:attrName>style.visibility</p:attrName>
+                                        </p:attrNameLst>
+                                      </p:cBhvr>
+                                      <p:to>
+                                        <p:strVal val="visible"/>
+                                      </p:to>
+                                    </p:set>
+                                  </p:childTnLst>
+                                </p:cTn>
+                              </p:par>
+                              <p:par>
+                                <p:cTn id="33" presetID="1" presetClass="entr" presetSubtype="0" fill="hold" grpId="0" nodeType="withEffect">
+                                  <p:stCondLst>
+                                    <p:cond delay="0"/>
+                                  </p:stCondLst>
+                                  <p:childTnLst>
+                                    <p:set>
+                                      <p:cBhvr>
+                                        <p:cTn id="34" dur="1" fill="hold">
+                                          <p:stCondLst>
+                                            <p:cond delay="0"/>
+                                          </p:stCondLst>
+                                        </p:cTn>
+                                        <p:tgtEl>
+                                          <p:spTgt spid="3">
+                                            <p:txEl>
+                                              <p:pRg st="9" end="9"/>
+                                            </p:txEl>
+                                          </p:spTgt>
+                                        </p:tgtEl>
+                                        <p:attrNameLst>
+                                          <p:attrName>style.visibility</p:attrName>
+                                        </p:attrNameLst>
+                                      </p:cBhvr>
+                                      <p:to>
+                                        <p:strVal val="visible"/>
+                                      </p:to>
+                                    </p:set>
+                                  </p:childTnLst>
+                                </p:cTn>
+                              </p:par>
+                              <p:par>
+                                <p:cTn id="35" presetID="1" presetClass="entr" presetSubtype="0" fill="hold" grpId="0" nodeType="withEffect">
+                                  <p:stCondLst>
+                                    <p:cond delay="0"/>
+                                  </p:stCondLst>
+                                  <p:childTnLst>
+                                    <p:set>
+                                      <p:cBhvr>
+                                        <p:cTn id="36" dur="1" fill="hold">
+                                          <p:stCondLst>
+                                            <p:cond delay="0"/>
+                                          </p:stCondLst>
+                                        </p:cTn>
+                                        <p:tgtEl>
+                                          <p:spTgt spid="3">
+                                            <p:txEl>
+                                              <p:pRg st="10" end="10"/>
+                                            </p:txEl>
+                                          </p:spTgt>
+                                        </p:tgtEl>
+                                        <p:attrNameLst>
+                                          <p:attrName>style.visibility</p:attrName>
+                                        </p:attrNameLst>
+                                      </p:cBhvr>
+                                      <p:to>
+                                        <p:strVal val="visible"/>
+                                      </p:to>
+                                    </p:set>
+                                  </p:childTnLst>
+                                </p:cTn>
+                              </p:par>
+                            </p:childTnLst>
+                          </p:cTn>
+                        </p:par>
+                      </p:childTnLst>
+                    </p:cTn>
+                  </p:par>
+                </p:childTnLst>
+              </p:cTn>
+              <p:prevCondLst>
+                <p:cond evt="onPrev" delay="0">
+                  <p:tgtEl>
+                    <p:sldTgt/>
+                  </p:tgtEl>
+                </p:cond>
+              </p:prevCondLst>
+              <p:nextCondLst>
+                <p:cond evt="onNext" delay="0">
+                  <p:tgtEl>
+                    <p:sldTgt/>
+                  </p:tgtEl>
+                </p:cond>
+              </p:nextCondLst>
+            </p:seq>
+          </p:childTnLst>
+        </p:cTn>
+      </p:par>
+    </p:tnLst>
+    <p:bldLst>
+      <p:bldP spid="3" grpId="0" build="p" bldLvl="2"/>
+    </p:bldLst>
+  </p:timing>
 </p:sld>
 </file>
 
@@ -5232,6 +6906,545 @@
   <p:clrMapOvr>
     <a:masterClrMapping/>
   </p:clrMapOvr>
+  <p:timing>
+    <p:tnLst>
+      <p:par>
+        <p:cTn id="1" dur="indefinite" restart="never" nodeType="tmRoot">
+          <p:childTnLst>
+            <p:seq concurrent="1" nextAc="seek">
+              <p:cTn id="2" dur="indefinite" nodeType="mainSeq">
+                <p:childTnLst>
+                  <p:par>
+                    <p:cTn id="3" fill="hold">
+                      <p:stCondLst>
+                        <p:cond delay="indefinite"/>
+                      </p:stCondLst>
+                      <p:childTnLst>
+                        <p:par>
+                          <p:cTn id="4" fill="hold">
+                            <p:stCondLst>
+                              <p:cond delay="0"/>
+                            </p:stCondLst>
+                            <p:childTnLst>
+                              <p:par>
+                                <p:cTn id="5" presetID="1" presetClass="entr" presetSubtype="0" fill="hold" grpId="0" nodeType="clickEffect">
+                                  <p:stCondLst>
+                                    <p:cond delay="0"/>
+                                  </p:stCondLst>
+                                  <p:childTnLst>
+                                    <p:set>
+                                      <p:cBhvr>
+                                        <p:cTn id="6" dur="1" fill="hold">
+                                          <p:stCondLst>
+                                            <p:cond delay="0"/>
+                                          </p:stCondLst>
+                                        </p:cTn>
+                                        <p:tgtEl>
+                                          <p:spTgt spid="3">
+                                            <p:txEl>
+                                              <p:pRg st="0" end="0"/>
+                                            </p:txEl>
+                                          </p:spTgt>
+                                        </p:tgtEl>
+                                        <p:attrNameLst>
+                                          <p:attrName>style.visibility</p:attrName>
+                                        </p:attrNameLst>
+                                      </p:cBhvr>
+                                      <p:to>
+                                        <p:strVal val="visible"/>
+                                      </p:to>
+                                    </p:set>
+                                  </p:childTnLst>
+                                </p:cTn>
+                              </p:par>
+                            </p:childTnLst>
+                          </p:cTn>
+                        </p:par>
+                      </p:childTnLst>
+                    </p:cTn>
+                  </p:par>
+                  <p:par>
+                    <p:cTn id="7" fill="hold">
+                      <p:stCondLst>
+                        <p:cond delay="indefinite"/>
+                      </p:stCondLst>
+                      <p:childTnLst>
+                        <p:par>
+                          <p:cTn id="8" fill="hold">
+                            <p:stCondLst>
+                              <p:cond delay="0"/>
+                            </p:stCondLst>
+                            <p:childTnLst>
+                              <p:par>
+                                <p:cTn id="9" presetID="1" presetClass="entr" presetSubtype="0" fill="hold" grpId="0" nodeType="clickEffect">
+                                  <p:stCondLst>
+                                    <p:cond delay="0"/>
+                                  </p:stCondLst>
+                                  <p:childTnLst>
+                                    <p:set>
+                                      <p:cBhvr>
+                                        <p:cTn id="10" dur="1" fill="hold">
+                                          <p:stCondLst>
+                                            <p:cond delay="0"/>
+                                          </p:stCondLst>
+                                        </p:cTn>
+                                        <p:tgtEl>
+                                          <p:spTgt spid="3">
+                                            <p:txEl>
+                                              <p:pRg st="1" end="1"/>
+                                            </p:txEl>
+                                          </p:spTgt>
+                                        </p:tgtEl>
+                                        <p:attrNameLst>
+                                          <p:attrName>style.visibility</p:attrName>
+                                        </p:attrNameLst>
+                                      </p:cBhvr>
+                                      <p:to>
+                                        <p:strVal val="visible"/>
+                                      </p:to>
+                                    </p:set>
+                                  </p:childTnLst>
+                                </p:cTn>
+                              </p:par>
+                              <p:par>
+                                <p:cTn id="11" presetID="1" presetClass="entr" presetSubtype="0" fill="hold" grpId="0" nodeType="withEffect">
+                                  <p:stCondLst>
+                                    <p:cond delay="0"/>
+                                  </p:stCondLst>
+                                  <p:childTnLst>
+                                    <p:set>
+                                      <p:cBhvr>
+                                        <p:cTn id="12" dur="1" fill="hold">
+                                          <p:stCondLst>
+                                            <p:cond delay="0"/>
+                                          </p:stCondLst>
+                                        </p:cTn>
+                                        <p:tgtEl>
+                                          <p:spTgt spid="3">
+                                            <p:txEl>
+                                              <p:pRg st="2" end="2"/>
+                                            </p:txEl>
+                                          </p:spTgt>
+                                        </p:tgtEl>
+                                        <p:attrNameLst>
+                                          <p:attrName>style.visibility</p:attrName>
+                                        </p:attrNameLst>
+                                      </p:cBhvr>
+                                      <p:to>
+                                        <p:strVal val="visible"/>
+                                      </p:to>
+                                    </p:set>
+                                  </p:childTnLst>
+                                </p:cTn>
+                              </p:par>
+                              <p:par>
+                                <p:cTn id="13" presetID="1" presetClass="entr" presetSubtype="0" fill="hold" grpId="0" nodeType="withEffect">
+                                  <p:stCondLst>
+                                    <p:cond delay="0"/>
+                                  </p:stCondLst>
+                                  <p:childTnLst>
+                                    <p:set>
+                                      <p:cBhvr>
+                                        <p:cTn id="14" dur="1" fill="hold">
+                                          <p:stCondLst>
+                                            <p:cond delay="0"/>
+                                          </p:stCondLst>
+                                        </p:cTn>
+                                        <p:tgtEl>
+                                          <p:spTgt spid="3">
+                                            <p:txEl>
+                                              <p:pRg st="3" end="3"/>
+                                            </p:txEl>
+                                          </p:spTgt>
+                                        </p:tgtEl>
+                                        <p:attrNameLst>
+                                          <p:attrName>style.visibility</p:attrName>
+                                        </p:attrNameLst>
+                                      </p:cBhvr>
+                                      <p:to>
+                                        <p:strVal val="visible"/>
+                                      </p:to>
+                                    </p:set>
+                                  </p:childTnLst>
+                                </p:cTn>
+                              </p:par>
+                              <p:par>
+                                <p:cTn id="15" presetID="1" presetClass="entr" presetSubtype="0" fill="hold" grpId="0" nodeType="withEffect">
+                                  <p:stCondLst>
+                                    <p:cond delay="0"/>
+                                  </p:stCondLst>
+                                  <p:childTnLst>
+                                    <p:set>
+                                      <p:cBhvr>
+                                        <p:cTn id="16" dur="1" fill="hold">
+                                          <p:stCondLst>
+                                            <p:cond delay="0"/>
+                                          </p:stCondLst>
+                                        </p:cTn>
+                                        <p:tgtEl>
+                                          <p:spTgt spid="3">
+                                            <p:txEl>
+                                              <p:pRg st="4" end="4"/>
+                                            </p:txEl>
+                                          </p:spTgt>
+                                        </p:tgtEl>
+                                        <p:attrNameLst>
+                                          <p:attrName>style.visibility</p:attrName>
+                                        </p:attrNameLst>
+                                      </p:cBhvr>
+                                      <p:to>
+                                        <p:strVal val="visible"/>
+                                      </p:to>
+                                    </p:set>
+                                  </p:childTnLst>
+                                </p:cTn>
+                              </p:par>
+                              <p:par>
+                                <p:cTn id="17" presetID="1" presetClass="entr" presetSubtype="0" fill="hold" grpId="0" nodeType="withEffect">
+                                  <p:stCondLst>
+                                    <p:cond delay="0"/>
+                                  </p:stCondLst>
+                                  <p:childTnLst>
+                                    <p:set>
+                                      <p:cBhvr>
+                                        <p:cTn id="18" dur="1" fill="hold">
+                                          <p:stCondLst>
+                                            <p:cond delay="0"/>
+                                          </p:stCondLst>
+                                        </p:cTn>
+                                        <p:tgtEl>
+                                          <p:spTgt spid="3">
+                                            <p:txEl>
+                                              <p:pRg st="5" end="5"/>
+                                            </p:txEl>
+                                          </p:spTgt>
+                                        </p:tgtEl>
+                                        <p:attrNameLst>
+                                          <p:attrName>style.visibility</p:attrName>
+                                        </p:attrNameLst>
+                                      </p:cBhvr>
+                                      <p:to>
+                                        <p:strVal val="visible"/>
+                                      </p:to>
+                                    </p:set>
+                                  </p:childTnLst>
+                                </p:cTn>
+                              </p:par>
+                            </p:childTnLst>
+                          </p:cTn>
+                        </p:par>
+                      </p:childTnLst>
+                    </p:cTn>
+                  </p:par>
+                  <p:par>
+                    <p:cTn id="19" fill="hold">
+                      <p:stCondLst>
+                        <p:cond delay="indefinite"/>
+                      </p:stCondLst>
+                      <p:childTnLst>
+                        <p:par>
+                          <p:cTn id="20" fill="hold">
+                            <p:stCondLst>
+                              <p:cond delay="0"/>
+                            </p:stCondLst>
+                            <p:childTnLst>
+                              <p:par>
+                                <p:cTn id="21" presetID="1" presetClass="entr" presetSubtype="0" fill="hold" grpId="0" nodeType="clickEffect">
+                                  <p:stCondLst>
+                                    <p:cond delay="0"/>
+                                  </p:stCondLst>
+                                  <p:childTnLst>
+                                    <p:set>
+                                      <p:cBhvr>
+                                        <p:cTn id="22" dur="1" fill="hold">
+                                          <p:stCondLst>
+                                            <p:cond delay="0"/>
+                                          </p:stCondLst>
+                                        </p:cTn>
+                                        <p:tgtEl>
+                                          <p:spTgt spid="3">
+                                            <p:txEl>
+                                              <p:pRg st="6" end="6"/>
+                                            </p:txEl>
+                                          </p:spTgt>
+                                        </p:tgtEl>
+                                        <p:attrNameLst>
+                                          <p:attrName>style.visibility</p:attrName>
+                                        </p:attrNameLst>
+                                      </p:cBhvr>
+                                      <p:to>
+                                        <p:strVal val="visible"/>
+                                      </p:to>
+                                    </p:set>
+                                  </p:childTnLst>
+                                </p:cTn>
+                              </p:par>
+                              <p:par>
+                                <p:cTn id="23" presetID="1" presetClass="entr" presetSubtype="0" fill="hold" grpId="0" nodeType="withEffect">
+                                  <p:stCondLst>
+                                    <p:cond delay="0"/>
+                                  </p:stCondLst>
+                                  <p:childTnLst>
+                                    <p:set>
+                                      <p:cBhvr>
+                                        <p:cTn id="24" dur="1" fill="hold">
+                                          <p:stCondLst>
+                                            <p:cond delay="0"/>
+                                          </p:stCondLst>
+                                        </p:cTn>
+                                        <p:tgtEl>
+                                          <p:spTgt spid="3">
+                                            <p:txEl>
+                                              <p:pRg st="7" end="7"/>
+                                            </p:txEl>
+                                          </p:spTgt>
+                                        </p:tgtEl>
+                                        <p:attrNameLst>
+                                          <p:attrName>style.visibility</p:attrName>
+                                        </p:attrNameLst>
+                                      </p:cBhvr>
+                                      <p:to>
+                                        <p:strVal val="visible"/>
+                                      </p:to>
+                                    </p:set>
+                                  </p:childTnLst>
+                                </p:cTn>
+                              </p:par>
+                              <p:par>
+                                <p:cTn id="25" presetID="1" presetClass="entr" presetSubtype="0" fill="hold" grpId="0" nodeType="withEffect">
+                                  <p:stCondLst>
+                                    <p:cond delay="0"/>
+                                  </p:stCondLst>
+                                  <p:childTnLst>
+                                    <p:set>
+                                      <p:cBhvr>
+                                        <p:cTn id="26" dur="1" fill="hold">
+                                          <p:stCondLst>
+                                            <p:cond delay="0"/>
+                                          </p:stCondLst>
+                                        </p:cTn>
+                                        <p:tgtEl>
+                                          <p:spTgt spid="3">
+                                            <p:txEl>
+                                              <p:pRg st="8" end="8"/>
+                                            </p:txEl>
+                                          </p:spTgt>
+                                        </p:tgtEl>
+                                        <p:attrNameLst>
+                                          <p:attrName>style.visibility</p:attrName>
+                                        </p:attrNameLst>
+                                      </p:cBhvr>
+                                      <p:to>
+                                        <p:strVal val="visible"/>
+                                      </p:to>
+                                    </p:set>
+                                  </p:childTnLst>
+                                </p:cTn>
+                              </p:par>
+                            </p:childTnLst>
+                          </p:cTn>
+                        </p:par>
+                      </p:childTnLst>
+                    </p:cTn>
+                  </p:par>
+                  <p:par>
+                    <p:cTn id="27" fill="hold">
+                      <p:stCondLst>
+                        <p:cond delay="indefinite"/>
+                      </p:stCondLst>
+                      <p:childTnLst>
+                        <p:par>
+                          <p:cTn id="28" fill="hold">
+                            <p:stCondLst>
+                              <p:cond delay="0"/>
+                            </p:stCondLst>
+                            <p:childTnLst>
+                              <p:par>
+                                <p:cTn id="29" presetID="1" presetClass="entr" presetSubtype="0" fill="hold" grpId="0" nodeType="clickEffect">
+                                  <p:stCondLst>
+                                    <p:cond delay="0"/>
+                                  </p:stCondLst>
+                                  <p:childTnLst>
+                                    <p:set>
+                                      <p:cBhvr>
+                                        <p:cTn id="30" dur="1" fill="hold">
+                                          <p:stCondLst>
+                                            <p:cond delay="0"/>
+                                          </p:stCondLst>
+                                        </p:cTn>
+                                        <p:tgtEl>
+                                          <p:spTgt spid="3">
+                                            <p:txEl>
+                                              <p:pRg st="9" end="9"/>
+                                            </p:txEl>
+                                          </p:spTgt>
+                                        </p:tgtEl>
+                                        <p:attrNameLst>
+                                          <p:attrName>style.visibility</p:attrName>
+                                        </p:attrNameLst>
+                                      </p:cBhvr>
+                                      <p:to>
+                                        <p:strVal val="visible"/>
+                                      </p:to>
+                                    </p:set>
+                                  </p:childTnLst>
+                                </p:cTn>
+                              </p:par>
+                              <p:par>
+                                <p:cTn id="31" presetID="1" presetClass="entr" presetSubtype="0" fill="hold" grpId="0" nodeType="withEffect">
+                                  <p:stCondLst>
+                                    <p:cond delay="0"/>
+                                  </p:stCondLst>
+                                  <p:childTnLst>
+                                    <p:set>
+                                      <p:cBhvr>
+                                        <p:cTn id="32" dur="1" fill="hold">
+                                          <p:stCondLst>
+                                            <p:cond delay="0"/>
+                                          </p:stCondLst>
+                                        </p:cTn>
+                                        <p:tgtEl>
+                                          <p:spTgt spid="3">
+                                            <p:txEl>
+                                              <p:pRg st="10" end="10"/>
+                                            </p:txEl>
+                                          </p:spTgt>
+                                        </p:tgtEl>
+                                        <p:attrNameLst>
+                                          <p:attrName>style.visibility</p:attrName>
+                                        </p:attrNameLst>
+                                      </p:cBhvr>
+                                      <p:to>
+                                        <p:strVal val="visible"/>
+                                      </p:to>
+                                    </p:set>
+                                  </p:childTnLst>
+                                </p:cTn>
+                              </p:par>
+                              <p:par>
+                                <p:cTn id="33" presetID="1" presetClass="entr" presetSubtype="0" fill="hold" grpId="0" nodeType="withEffect">
+                                  <p:stCondLst>
+                                    <p:cond delay="0"/>
+                                  </p:stCondLst>
+                                  <p:childTnLst>
+                                    <p:set>
+                                      <p:cBhvr>
+                                        <p:cTn id="34" dur="1" fill="hold">
+                                          <p:stCondLst>
+                                            <p:cond delay="0"/>
+                                          </p:stCondLst>
+                                        </p:cTn>
+                                        <p:tgtEl>
+                                          <p:spTgt spid="3">
+                                            <p:txEl>
+                                              <p:pRg st="11" end="11"/>
+                                            </p:txEl>
+                                          </p:spTgt>
+                                        </p:tgtEl>
+                                        <p:attrNameLst>
+                                          <p:attrName>style.visibility</p:attrName>
+                                        </p:attrNameLst>
+                                      </p:cBhvr>
+                                      <p:to>
+                                        <p:strVal val="visible"/>
+                                      </p:to>
+                                    </p:set>
+                                  </p:childTnLst>
+                                </p:cTn>
+                              </p:par>
+                              <p:par>
+                                <p:cTn id="35" presetID="1" presetClass="entr" presetSubtype="0" fill="hold" grpId="0" nodeType="withEffect">
+                                  <p:stCondLst>
+                                    <p:cond delay="0"/>
+                                  </p:stCondLst>
+                                  <p:childTnLst>
+                                    <p:set>
+                                      <p:cBhvr>
+                                        <p:cTn id="36" dur="1" fill="hold">
+                                          <p:stCondLst>
+                                            <p:cond delay="0"/>
+                                          </p:stCondLst>
+                                        </p:cTn>
+                                        <p:tgtEl>
+                                          <p:spTgt spid="3">
+                                            <p:txEl>
+                                              <p:pRg st="12" end="12"/>
+                                            </p:txEl>
+                                          </p:spTgt>
+                                        </p:tgtEl>
+                                        <p:attrNameLst>
+                                          <p:attrName>style.visibility</p:attrName>
+                                        </p:attrNameLst>
+                                      </p:cBhvr>
+                                      <p:to>
+                                        <p:strVal val="visible"/>
+                                      </p:to>
+                                    </p:set>
+                                  </p:childTnLst>
+                                </p:cTn>
+                              </p:par>
+                              <p:par>
+                                <p:cTn id="37" presetID="1" presetClass="entr" presetSubtype="0" fill="hold" grpId="0" nodeType="withEffect">
+                                  <p:stCondLst>
+                                    <p:cond delay="0"/>
+                                  </p:stCondLst>
+                                  <p:childTnLst>
+                                    <p:set>
+                                      <p:cBhvr>
+                                        <p:cTn id="38" dur="1" fill="hold">
+                                          <p:stCondLst>
+                                            <p:cond delay="0"/>
+                                          </p:stCondLst>
+                                        </p:cTn>
+                                        <p:tgtEl>
+                                          <p:spTgt spid="3">
+                                            <p:txEl>
+                                              <p:pRg st="13" end="13"/>
+                                            </p:txEl>
+                                          </p:spTgt>
+                                        </p:tgtEl>
+                                        <p:attrNameLst>
+                                          <p:attrName>style.visibility</p:attrName>
+                                        </p:attrNameLst>
+                                      </p:cBhvr>
+                                      <p:to>
+                                        <p:strVal val="visible"/>
+                                      </p:to>
+                                    </p:set>
+                                  </p:childTnLst>
+                                </p:cTn>
+                              </p:par>
+                            </p:childTnLst>
+                          </p:cTn>
+                        </p:par>
+                      </p:childTnLst>
+                    </p:cTn>
+                  </p:par>
+                </p:childTnLst>
+              </p:cTn>
+              <p:prevCondLst>
+                <p:cond evt="onPrev" delay="0">
+                  <p:tgtEl>
+                    <p:sldTgt/>
+                  </p:tgtEl>
+                </p:cond>
+              </p:prevCondLst>
+              <p:nextCondLst>
+                <p:cond evt="onNext" delay="0">
+                  <p:tgtEl>
+                    <p:sldTgt/>
+                  </p:tgtEl>
+                </p:cond>
+              </p:nextCondLst>
+            </p:seq>
+          </p:childTnLst>
+        </p:cTn>
+      </p:par>
+    </p:tnLst>
+    <p:bldLst>
+      <p:bldP spid="3" grpId="0" build="p" bldLvl="2"/>
+    </p:bldLst>
+  </p:timing>
 </p:sld>
 </file>
 

</xml_diff>